<commit_message>
Some minor changes in slides
</commit_message>
<xml_diff>
--- a/zlot19.pptx
+++ b/zlot19.pptx
@@ -13578,89 +13578,6 @@
   <p:transition spd="slow">
     <p:fade thruBlk="1"/>
   </p:transition>
-  <p:timing>
-    <p:tnLst>
-      <p:par>
-        <p:cTn id="1" dur="indefinite" restart="never" nodeType="tmRoot">
-          <p:childTnLst>
-            <p:seq concurrent="1" nextAc="seek">
-              <p:cTn id="2" dur="indefinite" nodeType="mainSeq">
-                <p:childTnLst>
-                  <p:par>
-                    <p:cTn id="3" fill="hold">
-                      <p:stCondLst>
-                        <p:cond delay="indefinite"/>
-                      </p:stCondLst>
-                      <p:childTnLst>
-                        <p:par>
-                          <p:cTn id="4" fill="hold">
-                            <p:stCondLst>
-                              <p:cond delay="0"/>
-                            </p:stCondLst>
-                            <p:childTnLst>
-                              <p:par>
-                                <p:cTn id="5" presetID="10" presetClass="entr" presetSubtype="0" fill="hold" nodeType="clickEffect">
-                                  <p:stCondLst>
-                                    <p:cond delay="0"/>
-                                  </p:stCondLst>
-                                  <p:childTnLst>
-                                    <p:set>
-                                      <p:cBhvr>
-                                        <p:cTn id="6" dur="1" fill="hold">
-                                          <p:stCondLst>
-                                            <p:cond delay="0"/>
-                                          </p:stCondLst>
-                                        </p:cTn>
-                                        <p:tgtEl>
-                                          <p:spTgt spid="7"/>
-                                        </p:tgtEl>
-                                        <p:attrNameLst>
-                                          <p:attrName>style.visibility</p:attrName>
-                                        </p:attrNameLst>
-                                      </p:cBhvr>
-                                      <p:to>
-                                        <p:strVal val="visible"/>
-                                      </p:to>
-                                    </p:set>
-                                    <p:animEffect transition="in" filter="fade">
-                                      <p:cBhvr>
-                                        <p:cTn id="7" dur="500"/>
-                                        <p:tgtEl>
-                                          <p:spTgt spid="7"/>
-                                        </p:tgtEl>
-                                      </p:cBhvr>
-                                    </p:animEffect>
-                                  </p:childTnLst>
-                                </p:cTn>
-                              </p:par>
-                            </p:childTnLst>
-                          </p:cTn>
-                        </p:par>
-                      </p:childTnLst>
-                    </p:cTn>
-                  </p:par>
-                </p:childTnLst>
-              </p:cTn>
-              <p:prevCondLst>
-                <p:cond evt="onPrev" delay="0">
-                  <p:tgtEl>
-                    <p:sldTgt/>
-                  </p:tgtEl>
-                </p:cond>
-              </p:prevCondLst>
-              <p:nextCondLst>
-                <p:cond evt="onNext" delay="0">
-                  <p:tgtEl>
-                    <p:sldTgt/>
-                  </p:tgtEl>
-                </p:cond>
-              </p:nextCondLst>
-            </p:seq>
-          </p:childTnLst>
-        </p:cTn>
-      </p:par>
-    </p:tnLst>
-  </p:timing>
 </p:sld>
 </file>
 
@@ -16319,7 +16236,7 @@
                 </a:solidFill>
                 <a:latin typeface="Fira Code" panose="020B0809050000020004" pitchFamily="49" charset="0"/>
               </a:rPr>
-              <a:t>(T)</a:t>
+              <a:t>(x)</a:t>
             </a:r>
             <a:br>
               <a:rPr lang="pl-PL" sz="2800" dirty="0">
@@ -22322,12 +22239,14 @@
         </p:nvSpPr>
         <p:spPr/>
         <p:txBody>
-          <a:bodyPr/>
+          <a:bodyPr>
+            <a:normAutofit/>
+          </a:bodyPr>
           <a:lstStyle/>
           <a:p>
             <a:r>
               <a:rPr lang="pl-PL" dirty="0"/>
-              <a:t>Co to za język? (1)</a:t>
+              <a:t>Co to za język?</a:t>
             </a:r>
           </a:p>
         </p:txBody>
@@ -29160,15 +29079,12 @@
               </a:rPr>
               <a:t>end</a:t>
             </a:r>
-            <a:r>
-              <a:rPr lang="pl-PL" sz="2800" dirty="0">
-                <a:solidFill>
-                  <a:srgbClr val="000000"/>
-                </a:solidFill>
-                <a:latin typeface="Fira Code" panose="020B0809050000020004" pitchFamily="49" charset="0"/>
-              </a:rPr>
-              <a:t>;</a:t>
-            </a:r>
+            <a:endParaRPr lang="pl-PL" sz="2800" dirty="0">
+              <a:solidFill>
+                <a:srgbClr val="000000"/>
+              </a:solidFill>
+              <a:latin typeface="Fira Code" panose="020B0809050000020004" pitchFamily="49" charset="0"/>
+            </a:endParaRPr>
           </a:p>
           <a:p>
             <a:pPr lvl="1"/>
@@ -29887,7 +29803,7 @@
           <a:p>
             <a:r>
               <a:rPr lang="pl-PL" dirty="0"/>
-              <a:t>Co to za język? (2)</a:t>
+              <a:t>Co to za język?</a:t>
             </a:r>
           </a:p>
         </p:txBody>
@@ -38419,7 +38335,7 @@
           <a:p>
             <a:r>
               <a:rPr lang="pl-PL" dirty="0"/>
-              <a:t>Co to za język? (3)</a:t>
+              <a:t>Co to za język?</a:t>
             </a:r>
           </a:p>
         </p:txBody>
@@ -45155,7 +45071,7 @@
           <a:p>
             <a:r>
               <a:rPr lang="pl-PL" dirty="0"/>
-              <a:t>Co to za język? (4)</a:t>
+              <a:t>Co to za język?</a:t>
             </a:r>
           </a:p>
         </p:txBody>

</xml_diff>

<commit_message>
Minor updates and cleanups, no change of functionality
</commit_message>
<xml_diff>
--- a/zlot19.pptx
+++ b/zlot19.pptx
@@ -264,7 +264,7 @@
           <a:p>
             <a:fld id="{05444580-144A-4231-8901-FE505CD50BC2}" type="datetimeFigureOut">
               <a:rPr lang="pl-PL" smtClean="0"/>
-              <a:t>03.06.2019</a:t>
+              <a:t>04.06.2019</a:t>
             </a:fld>
             <a:endParaRPr lang="pl-PL"/>
           </a:p>
@@ -678,7 +678,7 @@
           <a:p>
             <a:fld id="{559DFA6A-D9D9-4E81-8B1C-2DD5C72134F8}" type="datetime1">
               <a:rPr lang="pl-PL" smtClean="0"/>
-              <a:t>03.06.2019</a:t>
+              <a:t>04.06.2019</a:t>
             </a:fld>
             <a:endParaRPr lang="pl-PL"/>
           </a:p>
@@ -1392,7 +1392,7 @@
           <a:p>
             <a:fld id="{A13086C4-1A73-4F64-89A3-CB579B14958F}" type="datetime1">
               <a:rPr lang="pl-PL" smtClean="0"/>
-              <a:t>03.06.2019</a:t>
+              <a:t>04.06.2019</a:t>
             </a:fld>
             <a:endParaRPr lang="pl-PL"/>
           </a:p>
@@ -1600,7 +1600,7 @@
           <a:p>
             <a:fld id="{8C75E671-FBC6-45FA-99D7-3E2871CB39DA}" type="datetime1">
               <a:rPr lang="pl-PL" smtClean="0"/>
-              <a:t>03.06.2019</a:t>
+              <a:t>04.06.2019</a:t>
             </a:fld>
             <a:endParaRPr lang="pl-PL"/>
           </a:p>
@@ -1798,7 +1798,7 @@
           <a:p>
             <a:fld id="{BC282B5D-35CC-4131-9866-CFC9DD6F375D}" type="datetime1">
               <a:rPr lang="pl-PL" smtClean="0"/>
-              <a:t>03.06.2019</a:t>
+              <a:t>04.06.2019</a:t>
             </a:fld>
             <a:endParaRPr lang="pl-PL"/>
           </a:p>
@@ -2073,7 +2073,7 @@
           <a:p>
             <a:fld id="{9CE20017-FA9E-4B1D-A73E-044A5F63B278}" type="datetime1">
               <a:rPr lang="pl-PL" smtClean="0"/>
-              <a:t>03.06.2019</a:t>
+              <a:t>04.06.2019</a:t>
             </a:fld>
             <a:endParaRPr lang="pl-PL"/>
           </a:p>
@@ -2338,7 +2338,7 @@
           <a:p>
             <a:fld id="{7C7A39BE-30AB-4243-992E-BAB730005B9F}" type="datetime1">
               <a:rPr lang="pl-PL" smtClean="0"/>
-              <a:t>03.06.2019</a:t>
+              <a:t>04.06.2019</a:t>
             </a:fld>
             <a:endParaRPr lang="pl-PL"/>
           </a:p>
@@ -2750,7 +2750,7 @@
           <a:p>
             <a:fld id="{305A7EE8-9690-4315-AF6D-29FAC91A3DFC}" type="datetime1">
               <a:rPr lang="pl-PL" smtClean="0"/>
-              <a:t>03.06.2019</a:t>
+              <a:t>04.06.2019</a:t>
             </a:fld>
             <a:endParaRPr lang="pl-PL"/>
           </a:p>
@@ -3415,7 +3415,7 @@
           <a:p>
             <a:fld id="{591196E3-26E6-42B7-A5C6-EEF7C2058DD7}" type="datetime1">
               <a:rPr lang="pl-PL" smtClean="0"/>
-              <a:t>03.06.2019</a:t>
+              <a:t>04.06.2019</a:t>
             </a:fld>
             <a:endParaRPr lang="pl-PL"/>
           </a:p>
@@ -4126,7 +4126,7 @@
           <a:p>
             <a:fld id="{F572BA5F-E465-4E5B-B000-9943F1E56807}" type="datetime1">
               <a:rPr lang="pl-PL" smtClean="0"/>
-              <a:t>03.06.2019</a:t>
+              <a:t>04.06.2019</a:t>
             </a:fld>
             <a:endParaRPr lang="pl-PL"/>
           </a:p>
@@ -4437,7 +4437,7 @@
           <a:p>
             <a:fld id="{6EC4D7DA-B9C5-4D10-9F6D-57A8F3912D86}" type="datetime1">
               <a:rPr lang="pl-PL" smtClean="0"/>
-              <a:t>03.06.2019</a:t>
+              <a:t>04.06.2019</a:t>
             </a:fld>
             <a:endParaRPr lang="pl-PL"/>
           </a:p>
@@ -4725,7 +4725,7 @@
           <a:p>
             <a:fld id="{3046EC27-9862-401E-8B60-255AF79AB55D}" type="datetime1">
               <a:rPr lang="pl-PL" smtClean="0"/>
-              <a:t>03.06.2019</a:t>
+              <a:t>04.06.2019</a:t>
             </a:fld>
             <a:endParaRPr lang="pl-PL"/>
           </a:p>
@@ -4966,7 +4966,7 @@
           <a:p>
             <a:fld id="{D21863B4-94EB-456B-BD3D-DBC935558090}" type="datetime1">
               <a:rPr lang="pl-PL" smtClean="0"/>
-              <a:t>03.06.2019</a:t>
+              <a:t>04.06.2019</a:t>
             </a:fld>
             <a:endParaRPr lang="pl-PL"/>
           </a:p>
@@ -31252,7 +31252,7 @@
                 </a:solidFill>
                 <a:latin typeface="Fira Code" panose="020B0809050000020004" pitchFamily="49" charset="0"/>
               </a:rPr>
-              <a:t>Procedure</a:t>
+              <a:t>procedure</a:t>
             </a:r>
             <a:r>
               <a:rPr lang="pl-PL" dirty="0">
@@ -46448,7 +46448,7 @@
         <p:spPr>
           <a:xfrm>
             <a:off x="1811787" y="1093371"/>
-            <a:ext cx="8930906" cy="5262979"/>
+            <a:ext cx="8892114" cy="5262979"/>
           </a:xfrm>
           <a:prstGeom prst="rect">
             <a:avLst/>
@@ -46516,19 +46516,11 @@
             </a:pPr>
             <a:r>
               <a:rPr lang="pl-PL" sz="2800" dirty="0"/>
-              <a:t>Funkcje anonimowe,  dopełnienia (</a:t>
+              <a:t>Funkcje anonimowe (lambda),  dopełnienia (</a:t>
             </a:r>
             <a:r>
               <a:rPr lang="pl-PL" sz="2800" dirty="0" err="1"/>
               <a:t>closures</a:t>
-            </a:r>
-            <a:r>
-              <a:rPr lang="pl-PL" sz="2800" dirty="0"/>
-              <a:t>, </a:t>
-            </a:r>
-            <a:r>
-              <a:rPr lang="pl-PL" sz="2800" dirty="0" err="1"/>
-              <a:t>captures</a:t>
             </a:r>
             <a:r>
               <a:rPr lang="pl-PL" sz="2800" dirty="0"/>

</xml_diff>